<commit_message>
Finnished wih the basic functionality of the cardHandler class
</commit_message>
<xml_diff>
--- a/Doc/flowChart.pptx
+++ b/Doc/flowChart.pptx
@@ -3226,7 +3226,7 @@
         </p:nvSpPr>
         <p:spPr>
           <a:xfrm>
-            <a:off x="5105400" y="2209800"/>
+            <a:off x="5105400" y="2806700"/>
             <a:ext cx="1066800" cy="622300"/>
           </a:xfrm>
           <a:prstGeom prst="rect">
@@ -3271,7 +3271,7 @@
         <p:spPr>
           <a:xfrm>
             <a:off x="4876800" y="2051050"/>
-            <a:ext cx="762000" cy="158750"/>
+            <a:ext cx="762000" cy="755650"/>
           </a:xfrm>
           <a:prstGeom prst="bentConnector2">
             <a:avLst/>
@@ -3375,7 +3375,7 @@
         </p:nvSpPr>
         <p:spPr>
           <a:xfrm>
-            <a:off x="3794400" y="3098800"/>
+            <a:off x="3794400" y="3695700"/>
             <a:ext cx="1066800" cy="622300"/>
           </a:xfrm>
           <a:prstGeom prst="rect">
@@ -3419,7 +3419,7 @@
         </p:nvCxnSpPr>
         <p:spPr>
           <a:xfrm>
-            <a:off x="5638800" y="2832100"/>
+            <a:off x="5638800" y="3429000"/>
             <a:ext cx="0" cy="270885"/>
           </a:xfrm>
           <a:prstGeom prst="straightConnector1">
@@ -3452,7 +3452,7 @@
         </p:nvSpPr>
         <p:spPr>
           <a:xfrm>
-            <a:off x="5105400" y="3102985"/>
+            <a:off x="5105400" y="3699885"/>
             <a:ext cx="1066800" cy="618115"/>
           </a:xfrm>
           <a:prstGeom prst="diamond">
@@ -3497,7 +3497,7 @@
         </p:nvCxnSpPr>
         <p:spPr>
           <a:xfrm flipH="1" flipV="1">
-            <a:off x="4861200" y="3409950"/>
+            <a:off x="4861200" y="4006850"/>
             <a:ext cx="244200" cy="2093"/>
           </a:xfrm>
           <a:prstGeom prst="straightConnector1">
@@ -3534,7 +3534,7 @@
         <p:spPr>
           <a:xfrm rot="10800000" flipH="1">
             <a:off x="3794400" y="2051050"/>
-            <a:ext cx="15600" cy="1358900"/>
+            <a:ext cx="15600" cy="1955800"/>
           </a:xfrm>
           <a:prstGeom prst="bentConnector3">
             <a:avLst>
@@ -3568,7 +3568,7 @@
         </p:nvSpPr>
         <p:spPr>
           <a:xfrm>
-            <a:off x="5118100" y="4025900"/>
+            <a:off x="3794399" y="4559300"/>
             <a:ext cx="1066800" cy="622300"/>
           </a:xfrm>
           <a:prstGeom prst="rect">
@@ -3596,15 +3596,19 @@
             <a:pPr algn="ctr"/>
             <a:r>
               <a:rPr lang="nb-NO" sz="1200" dirty="0" smtClean="0"/>
-              <a:t>Send «</a:t>
+              <a:t>Offer hand to </a:t>
             </a:r>
             <a:r>
               <a:rPr lang="nb-NO" sz="1200" dirty="0" err="1" smtClean="0"/>
-              <a:t>your</a:t>
-            </a:r>
-            <a:r>
-              <a:rPr lang="nb-NO" sz="1200" smtClean="0"/>
-              <a:t> turn»</a:t>
+              <a:t>next</a:t>
+            </a:r>
+            <a:r>
+              <a:rPr lang="nb-NO" sz="1200" dirty="0" smtClean="0"/>
+              <a:t> </a:t>
+            </a:r>
+            <a:r>
+              <a:rPr lang="nb-NO" sz="1200" dirty="0" err="1" smtClean="0"/>
+              <a:t>player</a:t>
             </a:r>
             <a:endParaRPr lang="en-US" sz="1200" dirty="0" smtClean="0"/>
           </a:p>
@@ -3620,13 +3624,13 @@
           <p:nvPr/>
         </p:nvCxnSpPr>
         <p:spPr>
-          <a:xfrm>
-            <a:off x="6172200" y="3412043"/>
-            <a:ext cx="12700" cy="925007"/>
+          <a:xfrm flipH="1">
+            <a:off x="4861199" y="4008943"/>
+            <a:ext cx="1311001" cy="861507"/>
           </a:xfrm>
           <a:prstGeom prst="bentConnector3">
             <a:avLst>
-              <a:gd name="adj1" fmla="val 2240157"/>
+              <a:gd name="adj1" fmla="val -17437"/>
             </a:avLst>
           </a:prstGeom>
           <a:ln>
@@ -3656,8 +3660,8 @@
         </p:nvSpPr>
         <p:spPr>
           <a:xfrm>
-            <a:off x="6096000" y="3102985"/>
-            <a:ext cx="404406" cy="276999"/>
+            <a:off x="6172200" y="3742188"/>
+            <a:ext cx="386644" cy="276999"/>
           </a:xfrm>
           <a:prstGeom prst="rect">
             <a:avLst/>
@@ -3672,89 +3676,12 @@
           <a:p>
             <a:r>
               <a:rPr lang="nb-NO" sz="1200" dirty="0" smtClean="0"/>
-              <a:t>YES</a:t>
+              <a:t>NO</a:t>
             </a:r>
             <a:endParaRPr lang="en-US" sz="1200" dirty="0"/>
           </a:p>
         </p:txBody>
       </p:sp>
-      <p:sp>
-        <p:nvSpPr>
-          <p:cNvPr id="80" name="Rektangel 79"/>
-          <p:cNvSpPr/>
-          <p:nvPr/>
-        </p:nvSpPr>
-        <p:spPr>
-          <a:xfrm>
-            <a:off x="3794400" y="4021000"/>
-            <a:ext cx="1066800" cy="622300"/>
-          </a:xfrm>
-          <a:prstGeom prst="rect">
-            <a:avLst/>
-          </a:prstGeom>
-        </p:spPr>
-        <p:style>
-          <a:lnRef idx="1">
-            <a:schemeClr val="accent1"/>
-          </a:lnRef>
-          <a:fillRef idx="2">
-            <a:schemeClr val="accent1"/>
-          </a:fillRef>
-          <a:effectRef idx="1">
-            <a:schemeClr val="accent1"/>
-          </a:effectRef>
-          <a:fontRef idx="minor">
-            <a:schemeClr val="dk1"/>
-          </a:fontRef>
-        </p:style>
-        <p:txBody>
-          <a:bodyPr rtlCol="0" anchor="ctr"/>
-          <a:lstStyle/>
-          <a:p>
-            <a:pPr algn="ctr"/>
-            <a:r>
-              <a:rPr lang="en-US" sz="1200" dirty="0" smtClean="0"/>
-              <a:t>Offer Hand</a:t>
-            </a:r>
-          </a:p>
-        </p:txBody>
-      </p:sp>
-      <p:cxnSp>
-        <p:nvCxnSpPr>
-          <p:cNvPr id="82" name="Rett pil 81"/>
-          <p:cNvCxnSpPr>
-            <a:stCxn id="70" idx="1"/>
-            <a:endCxn id="80" idx="3"/>
-          </p:cNvCxnSpPr>
-          <p:nvPr/>
-        </p:nvCxnSpPr>
-        <p:spPr>
-          <a:xfrm flipH="1" flipV="1">
-            <a:off x="4861200" y="4332150"/>
-            <a:ext cx="256900" cy="4900"/>
-          </a:xfrm>
-          <a:prstGeom prst="straightConnector1">
-            <a:avLst/>
-          </a:prstGeom>
-          <a:ln>
-            <a:tailEnd type="arrow"/>
-          </a:ln>
-        </p:spPr>
-        <p:style>
-          <a:lnRef idx="1">
-            <a:schemeClr val="accent1"/>
-          </a:lnRef>
-          <a:fillRef idx="0">
-            <a:schemeClr val="accent1"/>
-          </a:fillRef>
-          <a:effectRef idx="0">
-            <a:schemeClr val="accent1"/>
-          </a:effectRef>
-          <a:fontRef idx="minor">
-            <a:schemeClr val="tx1"/>
-          </a:fontRef>
-        </p:style>
-      </p:cxnSp>
     </p:spTree>
     <p:extLst>
       <p:ext uri="{BB962C8B-B14F-4D97-AF65-F5344CB8AC3E}">

</xml_diff>